<commit_message>
added breakpoint code, updated plot, removed archive items
</commit_message>
<xml_diff>
--- a/Figures/Niwot/combo_edits.pptx
+++ b/Figures/Niwot/combo_edits.pptx
@@ -3351,10 +3351,10 @@
         </p:nvGrpSpPr>
         <p:grpSpPr>
           <a:xfrm>
-            <a:off x="360983" y="-36863"/>
-            <a:ext cx="7191610" cy="6931726"/>
-            <a:chOff x="360983" y="-36863"/>
-            <a:chExt cx="7191610" cy="6931726"/>
+            <a:off x="360983" y="-73726"/>
+            <a:ext cx="6514602" cy="6931726"/>
+            <a:chOff x="360983" y="-73726"/>
+            <a:chExt cx="6514602" cy="6931726"/>
           </a:xfrm>
         </p:grpSpPr>
         <p:grpSp>
@@ -3371,10 +3371,10 @@
           </p:nvGrpSpPr>
           <p:grpSpPr>
             <a:xfrm>
-              <a:off x="360983" y="-36863"/>
-              <a:ext cx="7191610" cy="6931726"/>
-              <a:chOff x="360983" y="-36863"/>
-              <a:chExt cx="7191610" cy="6931726"/>
+              <a:off x="360983" y="-73726"/>
+              <a:ext cx="6514602" cy="6931726"/>
+              <a:chOff x="360983" y="-73726"/>
+              <a:chExt cx="6514602" cy="6931726"/>
             </a:xfrm>
           </p:grpSpPr>
           <p:pic>
@@ -3409,13 +3409,13 @@
                   </a:ext>
                 </a:extLst>
               </a:blip>
-              <a:srcRect l="12575" r="17990"/>
+              <a:srcRect l="11437" r="16578"/>
               <a:stretch/>
             </p:blipFill>
             <p:spPr>
               <a:xfrm>
-                <a:off x="576049" y="-36863"/>
-                <a:ext cx="6976544" cy="6931726"/>
+                <a:off x="364080" y="-73726"/>
+                <a:ext cx="6511505" cy="6931726"/>
               </a:xfrm>
               <a:prstGeom prst="rect">
                 <a:avLst/>

</xml_diff>

<commit_message>
updated MS with new figures
</commit_message>
<xml_diff>
--- a/Figures/Niwot/combo_edits.pptx
+++ b/Figures/Niwot/combo_edits.pptx
@@ -3351,10 +3351,10 @@
         </p:nvGrpSpPr>
         <p:grpSpPr>
           <a:xfrm>
-            <a:off x="360983" y="-73726"/>
-            <a:ext cx="6514602" cy="6931726"/>
-            <a:chOff x="360983" y="-73726"/>
-            <a:chExt cx="6514602" cy="6931726"/>
+            <a:off x="-61546" y="-323174"/>
+            <a:ext cx="7519765" cy="6931726"/>
+            <a:chOff x="-504606" y="-144064"/>
+            <a:chExt cx="7519765" cy="6931726"/>
           </a:xfrm>
         </p:grpSpPr>
         <p:grpSp>
@@ -3371,10 +3371,10 @@
           </p:nvGrpSpPr>
           <p:grpSpPr>
             <a:xfrm>
-              <a:off x="360983" y="-73726"/>
-              <a:ext cx="6514602" cy="6931726"/>
-              <a:chOff x="360983" y="-73726"/>
-              <a:chExt cx="6514602" cy="6931726"/>
+              <a:off x="-504606" y="-144064"/>
+              <a:ext cx="7519765" cy="6931726"/>
+              <a:chOff x="-504606" y="-144064"/>
+              <a:chExt cx="7519765" cy="6931726"/>
             </a:xfrm>
           </p:grpSpPr>
           <p:pic>
@@ -3409,13 +3409,13 @@
                   </a:ext>
                 </a:extLst>
               </a:blip>
-              <a:srcRect l="11437" r="16578"/>
+              <a:srcRect l="-1355" t="-4111" r="18197" b="4111"/>
               <a:stretch/>
             </p:blipFill>
             <p:spPr>
               <a:xfrm>
-                <a:off x="364080" y="-73726"/>
-                <a:ext cx="6511505" cy="6931726"/>
+                <a:off x="-504606" y="-144064"/>
+                <a:ext cx="7519765" cy="6931726"/>
               </a:xfrm>
               <a:prstGeom prst="rect">
                 <a:avLst/>
@@ -3549,7 +3549,7 @@
             </p:blipFill>
             <p:spPr>
               <a:xfrm>
-                <a:off x="360983" y="3721718"/>
+                <a:off x="724792" y="3917316"/>
                 <a:ext cx="1071474" cy="674188"/>
               </a:xfrm>
               <a:prstGeom prst="rect">
@@ -3572,7 +3572,7 @@
           </p:nvSpPr>
           <p:spPr>
             <a:xfrm>
-              <a:off x="1097579" y="3834539"/>
+              <a:off x="1461388" y="4030137"/>
               <a:ext cx="609600" cy="261610"/>
             </a:xfrm>
             <a:prstGeom prst="rect">
@@ -3610,7 +3610,7 @@
           </p:nvSpPr>
           <p:spPr>
             <a:xfrm>
-              <a:off x="1097579" y="4134296"/>
+              <a:off x="1461388" y="4329894"/>
               <a:ext cx="609600" cy="261610"/>
             </a:xfrm>
             <a:prstGeom prst="rect">

</xml_diff>